<commit_message>
added contents for user-defined MATLAB function
</commit_message>
<xml_diff>
--- a/Lesson3/Lesson3.pptx
+++ b/Lesson3/Lesson3.pptx
@@ -28,6 +28,8 @@
     <p:sldId id="277" r:id="rId22"/>
     <p:sldId id="278" r:id="rId23"/>
     <p:sldId id="279" r:id="rId24"/>
+    <p:sldId id="280" r:id="rId25"/>
+    <p:sldId id="281" r:id="rId26"/>
   </p:sldIdLst>
   <p:sldSz cx="12192000" cy="6858000"/>
   <p:notesSz cx="6858000" cy="9144000"/>
@@ -287,7 +289,7 @@
           <a:p>
             <a:fld id="{FA812131-9B73-4F7A-AECD-F561B567C6CA}" type="datetimeFigureOut">
               <a:rPr lang="ko-KR" altLang="en-US" smtClean="0"/>
-              <a:t>2020-08-16</a:t>
+              <a:t>2020-08-17</a:t>
             </a:fld>
             <a:endParaRPr lang="ko-KR" altLang="en-US"/>
           </a:p>
@@ -485,7 +487,7 @@
           <a:p>
             <a:fld id="{FA812131-9B73-4F7A-AECD-F561B567C6CA}" type="datetimeFigureOut">
               <a:rPr lang="ko-KR" altLang="en-US" smtClean="0"/>
-              <a:t>2020-08-16</a:t>
+              <a:t>2020-08-17</a:t>
             </a:fld>
             <a:endParaRPr lang="ko-KR" altLang="en-US"/>
           </a:p>
@@ -693,7 +695,7 @@
           <a:p>
             <a:fld id="{FA812131-9B73-4F7A-AECD-F561B567C6CA}" type="datetimeFigureOut">
               <a:rPr lang="ko-KR" altLang="en-US" smtClean="0"/>
-              <a:t>2020-08-16</a:t>
+              <a:t>2020-08-17</a:t>
             </a:fld>
             <a:endParaRPr lang="ko-KR" altLang="en-US"/>
           </a:p>
@@ -891,7 +893,7 @@
           <a:p>
             <a:fld id="{FA812131-9B73-4F7A-AECD-F561B567C6CA}" type="datetimeFigureOut">
               <a:rPr lang="ko-KR" altLang="en-US" smtClean="0"/>
-              <a:t>2020-08-16</a:t>
+              <a:t>2020-08-17</a:t>
             </a:fld>
             <a:endParaRPr lang="ko-KR" altLang="en-US"/>
           </a:p>
@@ -1166,7 +1168,7 @@
           <a:p>
             <a:fld id="{FA812131-9B73-4F7A-AECD-F561B567C6CA}" type="datetimeFigureOut">
               <a:rPr lang="ko-KR" altLang="en-US" smtClean="0"/>
-              <a:t>2020-08-16</a:t>
+              <a:t>2020-08-17</a:t>
             </a:fld>
             <a:endParaRPr lang="ko-KR" altLang="en-US"/>
           </a:p>
@@ -1431,7 +1433,7 @@
           <a:p>
             <a:fld id="{FA812131-9B73-4F7A-AECD-F561B567C6CA}" type="datetimeFigureOut">
               <a:rPr lang="ko-KR" altLang="en-US" smtClean="0"/>
-              <a:t>2020-08-16</a:t>
+              <a:t>2020-08-17</a:t>
             </a:fld>
             <a:endParaRPr lang="ko-KR" altLang="en-US"/>
           </a:p>
@@ -1843,7 +1845,7 @@
           <a:p>
             <a:fld id="{FA812131-9B73-4F7A-AECD-F561B567C6CA}" type="datetimeFigureOut">
               <a:rPr lang="ko-KR" altLang="en-US" smtClean="0"/>
-              <a:t>2020-08-16</a:t>
+              <a:t>2020-08-17</a:t>
             </a:fld>
             <a:endParaRPr lang="ko-KR" altLang="en-US"/>
           </a:p>
@@ -1984,7 +1986,7 @@
           <a:p>
             <a:fld id="{FA812131-9B73-4F7A-AECD-F561B567C6CA}" type="datetimeFigureOut">
               <a:rPr lang="ko-KR" altLang="en-US" smtClean="0"/>
-              <a:t>2020-08-16</a:t>
+              <a:t>2020-08-17</a:t>
             </a:fld>
             <a:endParaRPr lang="ko-KR" altLang="en-US"/>
           </a:p>
@@ -2097,7 +2099,7 @@
           <a:p>
             <a:fld id="{FA812131-9B73-4F7A-AECD-F561B567C6CA}" type="datetimeFigureOut">
               <a:rPr lang="ko-KR" altLang="en-US" smtClean="0"/>
-              <a:t>2020-08-16</a:t>
+              <a:t>2020-08-17</a:t>
             </a:fld>
             <a:endParaRPr lang="ko-KR" altLang="en-US"/>
           </a:p>
@@ -2408,7 +2410,7 @@
           <a:p>
             <a:fld id="{FA812131-9B73-4F7A-AECD-F561B567C6CA}" type="datetimeFigureOut">
               <a:rPr lang="ko-KR" altLang="en-US" smtClean="0"/>
-              <a:t>2020-08-16</a:t>
+              <a:t>2020-08-17</a:t>
             </a:fld>
             <a:endParaRPr lang="ko-KR" altLang="en-US"/>
           </a:p>
@@ -2696,7 +2698,7 @@
           <a:p>
             <a:fld id="{FA812131-9B73-4F7A-AECD-F561B567C6CA}" type="datetimeFigureOut">
               <a:rPr lang="ko-KR" altLang="en-US" smtClean="0"/>
-              <a:t>2020-08-16</a:t>
+              <a:t>2020-08-17</a:t>
             </a:fld>
             <a:endParaRPr lang="ko-KR" altLang="en-US"/>
           </a:p>
@@ -2989,7 +2991,7 @@
           <a:p>
             <a:fld id="{FA812131-9B73-4F7A-AECD-F561B567C6CA}" type="datetimeFigureOut">
               <a:rPr lang="ko-KR" altLang="en-US" smtClean="0"/>
-              <a:t>2020-08-16</a:t>
+              <a:t>2020-08-17</a:t>
             </a:fld>
             <a:endParaRPr lang="ko-KR" altLang="en-US"/>
           </a:p>
@@ -5060,7 +5062,7 @@
         <p:spPr/>
         <p:txBody>
           <a:bodyPr>
-            <a:normAutofit lnSpcReduction="10000"/>
+            <a:normAutofit fontScale="92500" lnSpcReduction="20000"/>
           </a:bodyPr>
           <a:lstStyle/>
           <a:p>
@@ -5109,6 +5111,12 @@
             <a:r>
               <a:rPr lang="en-GB" altLang="ko-KR" dirty="0"/>
               <a:t>While loops</a:t>
+            </a:r>
+          </a:p>
+          <a:p>
+            <a:r>
+              <a:rPr lang="en-GB" altLang="ko-KR" dirty="0"/>
+              <a:t>Functions</a:t>
             </a:r>
           </a:p>
           <a:p>
@@ -5663,6 +5671,267 @@
     <p:extLst>
       <p:ext uri="{BB962C8B-B14F-4D97-AF65-F5344CB8AC3E}">
         <p14:creationId xmlns:p14="http://schemas.microsoft.com/office/powerpoint/2010/main" val="2496144078"/>
+      </p:ext>
+    </p:extLst>
+  </p:cSld>
+  <p:clrMapOvr>
+    <a:masterClrMapping/>
+  </p:clrMapOvr>
+</p:sld>
+</file>
+
+<file path=ppt/slides/slide24.xml><?xml version="1.0" encoding="utf-8"?>
+<p:sld xmlns:a="http://schemas.openxmlformats.org/drawingml/2006/main" xmlns:r="http://schemas.openxmlformats.org/officeDocument/2006/relationships" xmlns:p="http://schemas.openxmlformats.org/presentationml/2006/main">
+  <p:cSld>
+    <p:spTree>
+      <p:nvGrpSpPr>
+        <p:cNvPr id="1" name=""/>
+        <p:cNvGrpSpPr/>
+        <p:nvPr/>
+      </p:nvGrpSpPr>
+      <p:grpSpPr>
+        <a:xfrm>
+          <a:off x="0" y="0"/>
+          <a:ext cx="0" cy="0"/>
+          <a:chOff x="0" y="0"/>
+          <a:chExt cx="0" cy="0"/>
+        </a:xfrm>
+      </p:grpSpPr>
+      <p:sp>
+        <p:nvSpPr>
+          <p:cNvPr id="2" name="제목 1">
+            <a:extLst>
+              <a:ext uri="{FF2B5EF4-FFF2-40B4-BE49-F238E27FC236}">
+                <a16:creationId xmlns:a16="http://schemas.microsoft.com/office/drawing/2014/main" id="{F6983A38-51D3-47DB-9AB5-69C56ECED604}"/>
+              </a:ext>
+            </a:extLst>
+          </p:cNvPr>
+          <p:cNvSpPr>
+            <a:spLocks noGrp="1"/>
+          </p:cNvSpPr>
+          <p:nvPr>
+            <p:ph type="title"/>
+          </p:nvPr>
+        </p:nvSpPr>
+        <p:spPr/>
+        <p:txBody>
+          <a:bodyPr/>
+          <a:lstStyle/>
+          <a:p>
+            <a:r>
+              <a:rPr lang="en-GB" altLang="ko-KR"/>
+              <a:t>Functions</a:t>
+            </a:r>
+            <a:endParaRPr lang="ko-KR" altLang="en-US" dirty="0"/>
+          </a:p>
+        </p:txBody>
+      </p:sp>
+      <p:sp>
+        <p:nvSpPr>
+          <p:cNvPr id="3" name="내용 개체 틀 2">
+            <a:extLst>
+              <a:ext uri="{FF2B5EF4-FFF2-40B4-BE49-F238E27FC236}">
+                <a16:creationId xmlns:a16="http://schemas.microsoft.com/office/drawing/2014/main" id="{4850BF87-ECE4-44C0-8C4D-49C986583673}"/>
+              </a:ext>
+            </a:extLst>
+          </p:cNvPr>
+          <p:cNvSpPr>
+            <a:spLocks noGrp="1"/>
+          </p:cNvSpPr>
+          <p:nvPr>
+            <p:ph idx="1"/>
+          </p:nvPr>
+        </p:nvSpPr>
+        <p:spPr/>
+        <p:txBody>
+          <a:bodyPr>
+            <a:normAutofit/>
+          </a:bodyPr>
+          <a:lstStyle/>
+          <a:p>
+            <a:r>
+              <a:rPr lang="en-GB" altLang="ko-KR" dirty="0"/>
+              <a:t>We can make user-defined functions</a:t>
+            </a:r>
+          </a:p>
+          <a:p>
+            <a:endParaRPr lang="en-GB" altLang="ko-KR" dirty="0"/>
+          </a:p>
+          <a:p>
+            <a:r>
+              <a:rPr lang="en-GB" altLang="ko-KR" dirty="0"/>
+              <a:t>Why do we want functions?</a:t>
+            </a:r>
+          </a:p>
+          <a:p>
+            <a:pPr lvl="1"/>
+            <a:r>
+              <a:rPr lang="en-GB" altLang="ko-KR" dirty="0"/>
+              <a:t>To avoid repetitions of commands.</a:t>
+            </a:r>
+          </a:p>
+          <a:p>
+            <a:pPr lvl="1"/>
+            <a:r>
+              <a:rPr lang="en-GB" altLang="ko-KR" dirty="0"/>
+              <a:t>Without functions, we need to write all the codes in a single script.</a:t>
+            </a:r>
+          </a:p>
+          <a:p>
+            <a:pPr lvl="1"/>
+            <a:endParaRPr lang="en-GB" altLang="ko-KR" dirty="0"/>
+          </a:p>
+          <a:p>
+            <a:r>
+              <a:rPr lang="en-GB" altLang="ko-KR" dirty="0"/>
+              <a:t>We should separate the code into</a:t>
+            </a:r>
+          </a:p>
+          <a:p>
+            <a:pPr lvl="1"/>
+            <a:r>
+              <a:rPr lang="en-GB" altLang="ko-KR" dirty="0"/>
+              <a:t>1. main script</a:t>
+            </a:r>
+          </a:p>
+          <a:p>
+            <a:pPr lvl="1"/>
+            <a:r>
+              <a:rPr lang="en-GB" altLang="ko-KR" dirty="0"/>
+              <a:t>2. collection of functions</a:t>
+            </a:r>
+          </a:p>
+        </p:txBody>
+      </p:sp>
+    </p:spTree>
+    <p:extLst>
+      <p:ext uri="{BB962C8B-B14F-4D97-AF65-F5344CB8AC3E}">
+        <p14:creationId xmlns:p14="http://schemas.microsoft.com/office/powerpoint/2010/main" val="2405106704"/>
+      </p:ext>
+    </p:extLst>
+  </p:cSld>
+  <p:clrMapOvr>
+    <a:masterClrMapping/>
+  </p:clrMapOvr>
+</p:sld>
+</file>
+
+<file path=ppt/slides/slide25.xml><?xml version="1.0" encoding="utf-8"?>
+<p:sld xmlns:a="http://schemas.openxmlformats.org/drawingml/2006/main" xmlns:r="http://schemas.openxmlformats.org/officeDocument/2006/relationships" xmlns:p="http://schemas.openxmlformats.org/presentationml/2006/main">
+  <p:cSld>
+    <p:spTree>
+      <p:nvGrpSpPr>
+        <p:cNvPr id="1" name=""/>
+        <p:cNvGrpSpPr/>
+        <p:nvPr/>
+      </p:nvGrpSpPr>
+      <p:grpSpPr>
+        <a:xfrm>
+          <a:off x="0" y="0"/>
+          <a:ext cx="0" cy="0"/>
+          <a:chOff x="0" y="0"/>
+          <a:chExt cx="0" cy="0"/>
+        </a:xfrm>
+      </p:grpSpPr>
+      <p:sp>
+        <p:nvSpPr>
+          <p:cNvPr id="2" name="제목 1">
+            <a:extLst>
+              <a:ext uri="{FF2B5EF4-FFF2-40B4-BE49-F238E27FC236}">
+                <a16:creationId xmlns:a16="http://schemas.microsoft.com/office/drawing/2014/main" id="{F6983A38-51D3-47DB-9AB5-69C56ECED604}"/>
+              </a:ext>
+            </a:extLst>
+          </p:cNvPr>
+          <p:cNvSpPr>
+            <a:spLocks noGrp="1"/>
+          </p:cNvSpPr>
+          <p:nvPr>
+            <p:ph type="title"/>
+          </p:nvPr>
+        </p:nvSpPr>
+        <p:spPr/>
+        <p:txBody>
+          <a:bodyPr/>
+          <a:lstStyle/>
+          <a:p>
+            <a:r>
+              <a:rPr lang="en-GB" altLang="ko-KR"/>
+              <a:t>Functions</a:t>
+            </a:r>
+            <a:endParaRPr lang="ko-KR" altLang="en-US" dirty="0"/>
+          </a:p>
+        </p:txBody>
+      </p:sp>
+      <p:sp>
+        <p:nvSpPr>
+          <p:cNvPr id="3" name="내용 개체 틀 2">
+            <a:extLst>
+              <a:ext uri="{FF2B5EF4-FFF2-40B4-BE49-F238E27FC236}">
+                <a16:creationId xmlns:a16="http://schemas.microsoft.com/office/drawing/2014/main" id="{4850BF87-ECE4-44C0-8C4D-49C986583673}"/>
+              </a:ext>
+            </a:extLst>
+          </p:cNvPr>
+          <p:cNvSpPr>
+            <a:spLocks noGrp="1"/>
+          </p:cNvSpPr>
+          <p:nvPr>
+            <p:ph idx="1"/>
+          </p:nvPr>
+        </p:nvSpPr>
+        <p:spPr/>
+        <p:txBody>
+          <a:bodyPr>
+            <a:normAutofit/>
+          </a:bodyPr>
+          <a:lstStyle/>
+          <a:p>
+            <a:r>
+              <a:rPr lang="en-GB" altLang="ko-KR" dirty="0"/>
+              <a:t>function </a:t>
+            </a:r>
+            <a:r>
+              <a:rPr lang="en-GB" altLang="ko-KR" dirty="0" err="1"/>
+              <a:t>myFunc</a:t>
+            </a:r>
+            <a:r>
+              <a:rPr lang="en-GB" altLang="ko-KR" dirty="0"/>
+              <a:t>(parameter1, parameter2)</a:t>
+            </a:r>
+            <a:br>
+              <a:rPr lang="en-GB" altLang="ko-KR" dirty="0"/>
+            </a:br>
+            <a:r>
+              <a:rPr lang="en-GB" altLang="ko-KR" dirty="0"/>
+              <a:t>	operations…</a:t>
+            </a:r>
+            <a:br>
+              <a:rPr lang="en-GB" altLang="ko-KR" dirty="0"/>
+            </a:br>
+            <a:r>
+              <a:rPr lang="en-GB" altLang="ko-KR" dirty="0"/>
+              <a:t>end</a:t>
+            </a:r>
+          </a:p>
+          <a:p>
+            <a:endParaRPr lang="en-GB" altLang="ko-KR" dirty="0"/>
+          </a:p>
+          <a:p>
+            <a:r>
+              <a:rPr lang="en-GB" altLang="ko-KR" dirty="0"/>
+              <a:t>Need to be located at the bottom of </a:t>
+            </a:r>
+            <a:r>
+              <a:rPr lang="en-GB" altLang="ko-KR"/>
+              <a:t>the script.</a:t>
+            </a:r>
+            <a:endParaRPr lang="en-GB" altLang="ko-KR" dirty="0"/>
+          </a:p>
+        </p:txBody>
+      </p:sp>
+    </p:spTree>
+    <p:extLst>
+      <p:ext uri="{BB962C8B-B14F-4D97-AF65-F5344CB8AC3E}">
+        <p14:creationId xmlns:p14="http://schemas.microsoft.com/office/powerpoint/2010/main" val="3827168668"/>
       </p:ext>
     </p:extLst>
   </p:cSld>

</xml_diff>